<commit_message>
e removed slide show auto advancement from presentation
</commit_message>
<xml_diff>
--- a/docs/20210406_fleet_provisioning.pptx
+++ b/docs/20210406_fleet_provisioning.pptx
@@ -215,7 +215,7 @@
           <a:p>
             <a:fld id="{9FF550FD-5939-AA48-ACB8-945F291EF231}" type="datetimeFigureOut">
               <a:rPr lang="en-US" smtClean="0"/>
-              <a:t>4/4/21</a:t>
+              <a:t>4/6/21</a:t>
             </a:fld>
             <a:endParaRPr lang="en-US"/>
           </a:p>
@@ -670,7 +670,7 @@
             <a:fld id="{E6F9B8CD-342D-4579-98EC-A8FD6B7370E1}" type="datetimeFigureOut">
               <a:rPr lang="en-US" smtClean="0"/>
               <a:pPr/>
-              <a:t>4/4/21</a:t>
+              <a:t>4/6/21</a:t>
             </a:fld>
             <a:endParaRPr lang="en-US" dirty="0"/>
           </a:p>
@@ -983,7 +983,7 @@
             <a:fld id="{E6F9B8CD-342D-4579-98EC-A8FD6B7370E1}" type="datetimeFigureOut">
               <a:rPr lang="en-US" smtClean="0"/>
               <a:pPr algn="r" eaLnBrk="1" latinLnBrk="0" hangingPunct="1"/>
-              <a:t>4/4/21</a:t>
+              <a:t>4/6/21</a:t>
             </a:fld>
             <a:endParaRPr lang="en-US" dirty="0">
               <a:solidFill>
@@ -1204,7 +1204,7 @@
             <a:fld id="{E6F9B8CD-342D-4579-98EC-A8FD6B7370E1}" type="datetimeFigureOut">
               <a:rPr lang="en-US" smtClean="0"/>
               <a:pPr algn="r" eaLnBrk="1" latinLnBrk="0" hangingPunct="1"/>
-              <a:t>4/4/21</a:t>
+              <a:t>4/6/21</a:t>
             </a:fld>
             <a:endParaRPr lang="en-US" dirty="0">
               <a:solidFill>
@@ -1494,7 +1494,7 @@
             <a:fld id="{E6F9B8CD-342D-4579-98EC-A8FD6B7370E1}" type="datetimeFigureOut">
               <a:rPr lang="en-US" smtClean="0"/>
               <a:pPr algn="r" eaLnBrk="1" latinLnBrk="0" hangingPunct="1"/>
-              <a:t>4/4/21</a:t>
+              <a:t>4/6/21</a:t>
             </a:fld>
             <a:endParaRPr lang="en-US" dirty="0">
               <a:solidFill>
@@ -1947,7 +1947,7 @@
             <a:fld id="{E6F9B8CD-342D-4579-98EC-A8FD6B7370E1}" type="datetimeFigureOut">
               <a:rPr lang="en-US" smtClean="0"/>
               <a:pPr algn="r" eaLnBrk="1" latinLnBrk="0" hangingPunct="1"/>
-              <a:t>4/4/21</a:t>
+              <a:t>4/6/21</a:t>
             </a:fld>
             <a:endParaRPr lang="en-US" dirty="0">
               <a:solidFill>
@@ -2513,7 +2513,7 @@
             <a:fld id="{E6F9B8CD-342D-4579-98EC-A8FD6B7370E1}" type="datetimeFigureOut">
               <a:rPr lang="en-US" smtClean="0"/>
               <a:pPr algn="r" eaLnBrk="1" latinLnBrk="0" hangingPunct="1"/>
-              <a:t>4/4/21</a:t>
+              <a:t>4/6/21</a:t>
             </a:fld>
             <a:endParaRPr lang="en-US" dirty="0">
               <a:solidFill>
@@ -3406,7 +3406,7 @@
             <a:fld id="{E6F9B8CD-342D-4579-98EC-A8FD6B7370E1}" type="datetimeFigureOut">
               <a:rPr lang="en-US" smtClean="0"/>
               <a:pPr algn="r" eaLnBrk="1" latinLnBrk="0" hangingPunct="1"/>
-              <a:t>4/4/21</a:t>
+              <a:t>4/6/21</a:t>
             </a:fld>
             <a:endParaRPr lang="en-US" dirty="0">
               <a:solidFill>
@@ -3604,7 +3604,7 @@
             <a:fld id="{E6F9B8CD-342D-4579-98EC-A8FD6B7370E1}" type="datetimeFigureOut">
               <a:rPr lang="en-US" smtClean="0"/>
               <a:pPr/>
-              <a:t>4/4/21</a:t>
+              <a:t>4/6/21</a:t>
             </a:fld>
             <a:endParaRPr lang="en-US"/>
           </a:p>
@@ -3802,7 +3802,7 @@
             <a:fld id="{E6F9B8CD-342D-4579-98EC-A8FD6B7370E1}" type="datetimeFigureOut">
               <a:rPr lang="en-US" smtClean="0"/>
               <a:pPr/>
-              <a:t>4/4/21</a:t>
+              <a:t>4/6/21</a:t>
             </a:fld>
             <a:endParaRPr lang="en-US"/>
           </a:p>
@@ -3987,7 +3987,7 @@
             <a:fld id="{E6F9B8CD-342D-4579-98EC-A8FD6B7370E1}" type="datetimeFigureOut">
               <a:rPr lang="en-US" smtClean="0"/>
               <a:pPr algn="r" eaLnBrk="1" latinLnBrk="0" hangingPunct="1"/>
-              <a:t>4/4/21</a:t>
+              <a:t>4/6/21</a:t>
             </a:fld>
             <a:endParaRPr lang="en-US"/>
           </a:p>
@@ -4246,7 +4246,7 @@
             <a:fld id="{E6F9B8CD-342D-4579-98EC-A8FD6B7370E1}" type="datetimeFigureOut">
               <a:rPr lang="en-US" smtClean="0"/>
               <a:pPr/>
-              <a:t>4/4/21</a:t>
+              <a:t>4/6/21</a:t>
             </a:fld>
             <a:endParaRPr lang="en-US"/>
           </a:p>
@@ -4496,7 +4496,7 @@
             <a:fld id="{E6F9B8CD-342D-4579-98EC-A8FD6B7370E1}" type="datetimeFigureOut">
               <a:rPr lang="en-US" smtClean="0"/>
               <a:pPr/>
-              <a:t>4/4/21</a:t>
+              <a:t>4/6/21</a:t>
             </a:fld>
             <a:endParaRPr lang="en-US"/>
           </a:p>
@@ -4976,7 +4976,7 @@
             <a:fld id="{E6F9B8CD-342D-4579-98EC-A8FD6B7370E1}" type="datetimeFigureOut">
               <a:rPr lang="en-US" smtClean="0"/>
               <a:pPr/>
-              <a:t>4/4/21</a:t>
+              <a:t>4/6/21</a:t>
             </a:fld>
             <a:endParaRPr lang="en-US"/>
           </a:p>
@@ -5109,7 +5109,7 @@
             <a:fld id="{E6F9B8CD-342D-4579-98EC-A8FD6B7370E1}" type="datetimeFigureOut">
               <a:rPr lang="en-US" smtClean="0"/>
               <a:pPr algn="r" eaLnBrk="1" latinLnBrk="0" hangingPunct="1"/>
-              <a:t>4/4/21</a:t>
+              <a:t>4/6/21</a:t>
             </a:fld>
             <a:endParaRPr lang="en-US"/>
           </a:p>
@@ -5219,7 +5219,7 @@
             <a:fld id="{E6F9B8CD-342D-4579-98EC-A8FD6B7370E1}" type="datetimeFigureOut">
               <a:rPr lang="en-US" smtClean="0"/>
               <a:pPr/>
-              <a:t>4/4/21</a:t>
+              <a:t>4/6/21</a:t>
             </a:fld>
             <a:endParaRPr lang="en-US"/>
           </a:p>
@@ -5489,7 +5489,7 @@
             <a:fld id="{E6F9B8CD-342D-4579-98EC-A8FD6B7370E1}" type="datetimeFigureOut">
               <a:rPr lang="en-US" smtClean="0"/>
               <a:pPr algn="r" eaLnBrk="1" latinLnBrk="0" hangingPunct="1"/>
-              <a:t>4/4/21</a:t>
+              <a:t>4/6/21</a:t>
             </a:fld>
             <a:endParaRPr lang="en-US" dirty="0"/>
           </a:p>
@@ -5804,7 +5804,7 @@
             <a:fld id="{E6F9B8CD-342D-4579-98EC-A8FD6B7370E1}" type="datetimeFigureOut">
               <a:rPr lang="en-US" smtClean="0"/>
               <a:pPr algn="r" eaLnBrk="1" latinLnBrk="0" hangingPunct="1"/>
-              <a:t>4/4/21</a:t>
+              <a:t>4/6/21</a:t>
             </a:fld>
             <a:endParaRPr lang="en-US"/>
           </a:p>
@@ -6054,7 +6054,7 @@
             <a:fld id="{E6F9B8CD-342D-4579-98EC-A8FD6B7370E1}" type="datetimeFigureOut">
               <a:rPr lang="en-US" smtClean="0"/>
               <a:pPr algn="r" eaLnBrk="1" latinLnBrk="0" hangingPunct="1"/>
-              <a:t>4/4/21</a:t>
+              <a:t>4/6/21</a:t>
             </a:fld>
             <a:endParaRPr lang="en-US" dirty="0">
               <a:solidFill>

</xml_diff>